<commit_message>
tags not null, e adicionado sql a apresentacao
</commit_message>
<xml_diff>
--- a/sprint5/banco de dados/Sprint05.pptx
+++ b/sprint5/banco de dados/Sprint05.pptx
@@ -14,8 +14,9 @@
     <p:sldId id="261" r:id="rId8"/>
     <p:sldId id="262" r:id="rId9"/>
     <p:sldId id="258" r:id="rId10"/>
-    <p:sldId id="265" r:id="rId11"/>
-    <p:sldId id="266" r:id="rId12"/>
+    <p:sldId id="267" r:id="rId11"/>
+    <p:sldId id="265" r:id="rId12"/>
+    <p:sldId id="266" r:id="rId13"/>
   </p:sldIdLst>
   <p:sldSz cx="12192000" cy="6858000"/>
   <p:notesSz cx="6858000" cy="9144000"/>
@@ -3480,25 +3481,54 @@
           <a:lstStyle/>
           <a:p>
             <a:r>
-              <a:rPr lang="en-US" b="1" dirty="0" err="1"/>
-              <a:t>Inserindo</a:t>
-            </a:r>
-            <a:r>
-              <a:rPr lang="en-US" b="1" dirty="0"/>
-              <a:t> </a:t>
-            </a:r>
-            <a:r>
-              <a:rPr lang="en-US" b="1" dirty="0" err="1"/>
-              <a:t>valores</a:t>
-            </a:r>
-            <a:endParaRPr lang="pt-BR" b="1" dirty="0"/>
-          </a:p>
-        </p:txBody>
-      </p:sp>
+              <a:rPr lang="pt-BR" b="1" dirty="0"/>
+              <a:t>Cód. SQL</a:t>
+            </a:r>
+          </a:p>
+        </p:txBody>
+      </p:sp>
+      <p:pic>
+        <p:nvPicPr>
+          <p:cNvPr id="4" name="Imagem 3">
+            <a:extLst>
+              <a:ext uri="{FF2B5EF4-FFF2-40B4-BE49-F238E27FC236}">
+                <a16:creationId xmlns:a16="http://schemas.microsoft.com/office/drawing/2014/main" id="{961D0AE4-0C5F-5718-89C5-320FD80E56C8}"/>
+              </a:ext>
+            </a:extLst>
+          </p:cNvPr>
+          <p:cNvPicPr>
+            <a:picLocks noChangeAspect="1"/>
+          </p:cNvPicPr>
+          <p:nvPr/>
+        </p:nvPicPr>
+        <p:blipFill>
+          <a:blip r:embed="rId2"/>
+          <a:stretch>
+            <a:fillRect/>
+          </a:stretch>
+        </p:blipFill>
+        <p:spPr>
+          <a:xfrm>
+            <a:off x="3018995" y="1799997"/>
+            <a:ext cx="6154009" cy="3258005"/>
+          </a:xfrm>
+          <a:prstGeom prst="rect">
+            <a:avLst/>
+          </a:prstGeom>
+          <a:ln w="38100">
+            <a:solidFill>
+              <a:schemeClr val="tx1">
+                <a:lumMod val="85000"/>
+                <a:lumOff val="15000"/>
+              </a:schemeClr>
+            </a:solidFill>
+          </a:ln>
+        </p:spPr>
+      </p:pic>
     </p:spTree>
     <p:extLst>
       <p:ext uri="{BB962C8B-B14F-4D97-AF65-F5344CB8AC3E}">
-        <p14:creationId xmlns:p14="http://schemas.microsoft.com/office/powerpoint/2010/main" val="1851996342"/>
+        <p14:creationId xmlns:p14="http://schemas.microsoft.com/office/powerpoint/2010/main" val="643259857"/>
       </p:ext>
     </p:extLst>
   </p:cSld>
@@ -3548,7 +3578,82 @@
           <a:p>
             <a:r>
               <a:rPr lang="en-US" b="1" dirty="0" err="1"/>
+              <a:t>Inserindo</a:t>
+            </a:r>
+            <a:r>
+              <a:rPr lang="en-US" b="1" dirty="0"/>
+              <a:t> </a:t>
+            </a:r>
+            <a:r>
+              <a:rPr lang="en-US" b="1" dirty="0" err="1"/>
+              <a:t>valores</a:t>
+            </a:r>
+            <a:endParaRPr lang="pt-BR" b="1" dirty="0"/>
+          </a:p>
+        </p:txBody>
+      </p:sp>
+    </p:spTree>
+    <p:extLst>
+      <p:ext uri="{BB962C8B-B14F-4D97-AF65-F5344CB8AC3E}">
+        <p14:creationId xmlns:p14="http://schemas.microsoft.com/office/powerpoint/2010/main" val="1851996342"/>
+      </p:ext>
+    </p:extLst>
+  </p:cSld>
+  <p:clrMapOvr>
+    <a:masterClrMapping/>
+  </p:clrMapOvr>
+</p:sld>
+</file>
+
+<file path=ppt/slides/slide12.xml><?xml version="1.0" encoding="utf-8"?>
+<p:sld xmlns:a="http://schemas.openxmlformats.org/drawingml/2006/main" xmlns:r="http://schemas.openxmlformats.org/officeDocument/2006/relationships" xmlns:p="http://schemas.openxmlformats.org/presentationml/2006/main">
+  <p:cSld>
+    <p:spTree>
+      <p:nvGrpSpPr>
+        <p:cNvPr id="1" name=""/>
+        <p:cNvGrpSpPr/>
+        <p:nvPr/>
+      </p:nvGrpSpPr>
+      <p:grpSpPr>
+        <a:xfrm>
+          <a:off x="0" y="0"/>
+          <a:ext cx="0" cy="0"/>
+          <a:chOff x="0" y="0"/>
+          <a:chExt cx="0" cy="0"/>
+        </a:xfrm>
+      </p:grpSpPr>
+      <p:sp>
+        <p:nvSpPr>
+          <p:cNvPr id="2" name="Título 1">
+            <a:extLst>
+              <a:ext uri="{FF2B5EF4-FFF2-40B4-BE49-F238E27FC236}">
+                <a16:creationId xmlns:a16="http://schemas.microsoft.com/office/drawing/2014/main" id="{AF02B54C-7897-4CEA-7172-8780D3209CA5}"/>
+              </a:ext>
+            </a:extLst>
+          </p:cNvPr>
+          <p:cNvSpPr>
+            <a:spLocks noGrp="1"/>
+          </p:cNvSpPr>
+          <p:nvPr>
+            <p:ph type="title"/>
+          </p:nvPr>
+        </p:nvSpPr>
+        <p:spPr/>
+        <p:txBody>
+          <a:bodyPr/>
+          <a:lstStyle/>
+          <a:p>
+            <a:r>
+              <a:rPr lang="en-US" b="1" dirty="0" err="1"/>
               <a:t>Consultas</a:t>
+            </a:r>
+            <a:r>
+              <a:rPr lang="en-US" b="1" dirty="0"/>
+              <a:t> </a:t>
+            </a:r>
+            <a:r>
+              <a:rPr lang="en-US" b="1"/>
+              <a:t>(Select)</a:t>
             </a:r>
             <a:endParaRPr lang="pt-BR" b="1" dirty="0"/>
           </a:p>
@@ -3833,6 +3938,65 @@
           </a:p>
         </p:txBody>
       </p:sp>
+      <p:sp>
+        <p:nvSpPr>
+          <p:cNvPr id="3" name="CaixaDeTexto 2">
+            <a:extLst>
+              <a:ext uri="{FF2B5EF4-FFF2-40B4-BE49-F238E27FC236}">
+                <a16:creationId xmlns:a16="http://schemas.microsoft.com/office/drawing/2014/main" id="{03D4D740-6C2F-A76E-F710-B1E1CBE40485}"/>
+              </a:ext>
+            </a:extLst>
+          </p:cNvPr>
+          <p:cNvSpPr txBox="1"/>
+          <p:nvPr/>
+        </p:nvSpPr>
+        <p:spPr>
+          <a:xfrm>
+            <a:off x="1140822" y="1690688"/>
+            <a:ext cx="6035041" cy="646331"/>
+          </a:xfrm>
+          <a:prstGeom prst="rect">
+            <a:avLst/>
+          </a:prstGeom>
+          <a:noFill/>
+        </p:spPr>
+        <p:txBody>
+          <a:bodyPr wrap="square" rtlCol="0">
+            <a:spAutoFit/>
+          </a:bodyPr>
+          <a:lstStyle/>
+          <a:p>
+            <a:r>
+              <a:rPr lang="en-US" dirty="0"/>
+              <a:t>- </a:t>
+            </a:r>
+            <a:r>
+              <a:rPr lang="en-US" dirty="0" err="1"/>
+              <a:t>Atributos</a:t>
+            </a:r>
+            <a:r>
+              <a:rPr lang="en-US" dirty="0"/>
+              <a:t> </a:t>
+            </a:r>
+            <a:r>
+              <a:rPr lang="en-US" dirty="0" err="1"/>
+              <a:t>Atômicos</a:t>
+            </a:r>
+            <a:endParaRPr lang="en-US" dirty="0"/>
+          </a:p>
+          <a:p>
+            <a:r>
+              <a:rPr lang="en-US" dirty="0"/>
+              <a:t>- Sem </a:t>
+            </a:r>
+            <a:r>
+              <a:rPr lang="en-US" dirty="0" err="1"/>
+              <a:t>repetição</a:t>
+            </a:r>
+            <a:endParaRPr lang="en-US" dirty="0"/>
+          </a:p>
+        </p:txBody>
+      </p:sp>
     </p:spTree>
     <p:extLst>
       <p:ext uri="{BB962C8B-B14F-4D97-AF65-F5344CB8AC3E}">
@@ -4019,6 +4183,101 @@
           </a:p>
         </p:txBody>
       </p:sp>
+      <p:sp>
+        <p:nvSpPr>
+          <p:cNvPr id="3" name="CaixaDeTexto 2">
+            <a:extLst>
+              <a:ext uri="{FF2B5EF4-FFF2-40B4-BE49-F238E27FC236}">
+                <a16:creationId xmlns:a16="http://schemas.microsoft.com/office/drawing/2014/main" id="{800DD637-1F5E-4B48-415B-9F4B1C8A54A8}"/>
+              </a:ext>
+            </a:extLst>
+          </p:cNvPr>
+          <p:cNvSpPr txBox="1"/>
+          <p:nvPr/>
+        </p:nvSpPr>
+        <p:spPr>
+          <a:xfrm>
+            <a:off x="1140822" y="1690688"/>
+            <a:ext cx="6035041" cy="369332"/>
+          </a:xfrm>
+          <a:prstGeom prst="rect">
+            <a:avLst/>
+          </a:prstGeom>
+          <a:noFill/>
+        </p:spPr>
+        <p:txBody>
+          <a:bodyPr wrap="square" rtlCol="0">
+            <a:spAutoFit/>
+          </a:bodyPr>
+          <a:lstStyle/>
+          <a:p>
+            <a:r>
+              <a:rPr lang="en-US" dirty="0"/>
+              <a:t>- </a:t>
+            </a:r>
+            <a:r>
+              <a:rPr lang="en-US" dirty="0" err="1"/>
+              <a:t>Todos</a:t>
+            </a:r>
+            <a:r>
+              <a:rPr lang="en-US" dirty="0"/>
+              <a:t> </a:t>
+            </a:r>
+            <a:r>
+              <a:rPr lang="en-US" dirty="0" err="1"/>
+              <a:t>os</a:t>
+            </a:r>
+            <a:r>
+              <a:rPr lang="en-US" dirty="0"/>
+              <a:t> </a:t>
+            </a:r>
+            <a:r>
+              <a:rPr lang="en-US" dirty="0" err="1"/>
+              <a:t>atributos</a:t>
+            </a:r>
+            <a:r>
+              <a:rPr lang="en-US" dirty="0"/>
+              <a:t> </a:t>
+            </a:r>
+            <a:r>
+              <a:rPr lang="en-US" dirty="0" err="1"/>
+              <a:t>possuem</a:t>
+            </a:r>
+            <a:r>
+              <a:rPr lang="en-US" dirty="0"/>
+              <a:t>, </a:t>
+            </a:r>
+            <a:r>
+              <a:rPr lang="en-US" dirty="0" err="1"/>
+              <a:t>unicamente</a:t>
+            </a:r>
+            <a:r>
+              <a:rPr lang="en-US" dirty="0"/>
+              <a:t>, </a:t>
+            </a:r>
+            <a:r>
+              <a:rPr lang="en-US" b="1" dirty="0"/>
+              <a:t>da </a:t>
+            </a:r>
+            <a:r>
+              <a:rPr lang="en-US" b="1" dirty="0" err="1"/>
+              <a:t>chave</a:t>
+            </a:r>
+            <a:r>
+              <a:rPr lang="en-US" b="1" dirty="0"/>
+              <a:t> </a:t>
+            </a:r>
+            <a:r>
+              <a:rPr lang="en-US" b="1" dirty="0" err="1"/>
+              <a:t>primária</a:t>
+            </a:r>
+            <a:r>
+              <a:rPr lang="en-US" b="1" dirty="0"/>
+              <a:t>.</a:t>
+            </a:r>
+          </a:p>
+        </p:txBody>
+      </p:sp>
     </p:spTree>
     <p:extLst>
       <p:ext uri="{BB962C8B-B14F-4D97-AF65-F5344CB8AC3E}">
@@ -4215,6 +4474,180 @@
           </a:p>
         </p:txBody>
       </p:sp>
+      <p:sp>
+        <p:nvSpPr>
+          <p:cNvPr id="3" name="CaixaDeTexto 2">
+            <a:extLst>
+              <a:ext uri="{FF2B5EF4-FFF2-40B4-BE49-F238E27FC236}">
+                <a16:creationId xmlns:a16="http://schemas.microsoft.com/office/drawing/2014/main" id="{B4D0CBC9-9FD5-B77C-C546-8D38DA0281FD}"/>
+              </a:ext>
+            </a:extLst>
+          </p:cNvPr>
+          <p:cNvSpPr txBox="1"/>
+          <p:nvPr/>
+        </p:nvSpPr>
+        <p:spPr>
+          <a:xfrm>
+            <a:off x="1140822" y="1690688"/>
+            <a:ext cx="6035041" cy="923330"/>
+          </a:xfrm>
+          <a:prstGeom prst="rect">
+            <a:avLst/>
+          </a:prstGeom>
+          <a:noFill/>
+        </p:spPr>
+        <p:txBody>
+          <a:bodyPr wrap="square" rtlCol="0">
+            <a:spAutoFit/>
+          </a:bodyPr>
+          <a:lstStyle/>
+          <a:p>
+            <a:r>
+              <a:rPr lang="en-US" dirty="0"/>
+              <a:t>- </a:t>
+            </a:r>
+            <a:r>
+              <a:rPr lang="en-US" dirty="0" err="1"/>
+              <a:t>Todos</a:t>
+            </a:r>
+            <a:r>
+              <a:rPr lang="en-US" dirty="0"/>
+              <a:t> </a:t>
+            </a:r>
+            <a:r>
+              <a:rPr lang="en-US" dirty="0" err="1"/>
+              <a:t>os</a:t>
+            </a:r>
+            <a:r>
+              <a:rPr lang="en-US" dirty="0"/>
+              <a:t> </a:t>
+            </a:r>
+            <a:r>
+              <a:rPr lang="en-US" dirty="0" err="1"/>
+              <a:t>atributos</a:t>
+            </a:r>
+            <a:r>
+              <a:rPr lang="en-US" dirty="0"/>
+              <a:t> </a:t>
+            </a:r>
+            <a:r>
+              <a:rPr lang="en-US" dirty="0" err="1"/>
+              <a:t>estão</a:t>
+            </a:r>
+            <a:r>
+              <a:rPr lang="en-US" dirty="0"/>
+              <a:t> </a:t>
+            </a:r>
+            <a:r>
+              <a:rPr lang="en-US" dirty="0" err="1"/>
+              <a:t>somente</a:t>
+            </a:r>
+            <a:r>
+              <a:rPr lang="en-US" dirty="0"/>
+              <a:t> </a:t>
+            </a:r>
+            <a:r>
+              <a:rPr lang="en-US" dirty="0" err="1"/>
+              <a:t>relacionados</a:t>
+            </a:r>
+            <a:r>
+              <a:rPr lang="en-US" dirty="0"/>
+              <a:t> </a:t>
+            </a:r>
+            <a:r>
+              <a:rPr lang="en-US" dirty="0" err="1"/>
+              <a:t>às</a:t>
+            </a:r>
+            <a:r>
+              <a:rPr lang="en-US" dirty="0"/>
+              <a:t> </a:t>
+            </a:r>
+            <a:r>
+              <a:rPr lang="en-US" dirty="0" err="1"/>
+              <a:t>chaves</a:t>
+            </a:r>
+            <a:r>
+              <a:rPr lang="en-US" dirty="0"/>
+              <a:t> </a:t>
+            </a:r>
+            <a:r>
+              <a:rPr lang="en-US" dirty="0" err="1"/>
+              <a:t>primárias</a:t>
+            </a:r>
+            <a:r>
+              <a:rPr lang="en-US" dirty="0"/>
+              <a:t> de </a:t>
+            </a:r>
+            <a:r>
+              <a:rPr lang="en-US" dirty="0" err="1"/>
+              <a:t>suas</a:t>
+            </a:r>
+            <a:r>
+              <a:rPr lang="en-US" dirty="0"/>
+              <a:t> </a:t>
+            </a:r>
+            <a:r>
+              <a:rPr lang="en-US" dirty="0" err="1"/>
+              <a:t>respectivas</a:t>
+            </a:r>
+            <a:r>
+              <a:rPr lang="en-US" dirty="0"/>
+              <a:t> </a:t>
+            </a:r>
+            <a:r>
+              <a:rPr lang="en-US" dirty="0" err="1"/>
+              <a:t>tabelas</a:t>
+            </a:r>
+            <a:r>
+              <a:rPr lang="en-US" dirty="0"/>
+              <a:t>.</a:t>
+            </a:r>
+          </a:p>
+          <a:p>
+            <a:r>
+              <a:rPr lang="en-US" b="1" dirty="0"/>
+              <a:t>- </a:t>
+            </a:r>
+            <a:r>
+              <a:rPr lang="en-US" b="1" dirty="0" err="1"/>
+              <a:t>Não</a:t>
+            </a:r>
+            <a:r>
+              <a:rPr lang="en-US" b="1" dirty="0"/>
+              <a:t> </a:t>
+            </a:r>
+            <a:r>
+              <a:rPr lang="en-US" b="1" dirty="0" err="1"/>
+              <a:t>ocorre</a:t>
+            </a:r>
+            <a:r>
+              <a:rPr lang="en-US" b="1" dirty="0"/>
+              <a:t> a </a:t>
+            </a:r>
+            <a:r>
+              <a:rPr lang="en-US" b="1" dirty="0" err="1"/>
+              <a:t>Dependência</a:t>
+            </a:r>
+            <a:r>
+              <a:rPr lang="en-US" b="1" dirty="0"/>
+              <a:t> </a:t>
+            </a:r>
+            <a:r>
+              <a:rPr lang="en-US" b="1" dirty="0" err="1"/>
+              <a:t>Funcional</a:t>
+            </a:r>
+            <a:r>
+              <a:rPr lang="en-US" b="1" dirty="0"/>
+              <a:t> </a:t>
+            </a:r>
+            <a:r>
+              <a:rPr lang="en-US" b="1" dirty="0" err="1"/>
+              <a:t>Transitiva</a:t>
+            </a:r>
+            <a:endParaRPr lang="en-US" b="1" dirty="0"/>
+          </a:p>
+        </p:txBody>
+      </p:sp>
     </p:spTree>
     <p:extLst>
       <p:ext uri="{BB962C8B-B14F-4D97-AF65-F5344CB8AC3E}">
@@ -4273,6 +4706,82 @@
           </a:p>
         </p:txBody>
       </p:sp>
+      <p:pic>
+        <p:nvPicPr>
+          <p:cNvPr id="8" name="Imagem 7">
+            <a:extLst>
+              <a:ext uri="{FF2B5EF4-FFF2-40B4-BE49-F238E27FC236}">
+                <a16:creationId xmlns:a16="http://schemas.microsoft.com/office/drawing/2014/main" id="{FD27BF7E-356C-2F4E-62EE-3A1E1216599E}"/>
+              </a:ext>
+            </a:extLst>
+          </p:cNvPr>
+          <p:cNvPicPr>
+            <a:picLocks noChangeAspect="1"/>
+          </p:cNvPicPr>
+          <p:nvPr/>
+        </p:nvPicPr>
+        <p:blipFill>
+          <a:blip r:embed="rId2"/>
+          <a:stretch>
+            <a:fillRect/>
+          </a:stretch>
+        </p:blipFill>
+        <p:spPr>
+          <a:xfrm>
+            <a:off x="838200" y="1690688"/>
+            <a:ext cx="5677692" cy="3877216"/>
+          </a:xfrm>
+          <a:prstGeom prst="rect">
+            <a:avLst/>
+          </a:prstGeom>
+          <a:ln w="38100">
+            <a:solidFill>
+              <a:schemeClr val="tx1">
+                <a:lumMod val="85000"/>
+                <a:lumOff val="15000"/>
+              </a:schemeClr>
+            </a:solidFill>
+          </a:ln>
+        </p:spPr>
+      </p:pic>
+      <p:pic>
+        <p:nvPicPr>
+          <p:cNvPr id="10" name="Imagem 9">
+            <a:extLst>
+              <a:ext uri="{FF2B5EF4-FFF2-40B4-BE49-F238E27FC236}">
+                <a16:creationId xmlns:a16="http://schemas.microsoft.com/office/drawing/2014/main" id="{37B63418-5DB6-3389-9633-31ED31900AAD}"/>
+              </a:ext>
+            </a:extLst>
+          </p:cNvPr>
+          <p:cNvPicPr>
+            <a:picLocks noChangeAspect="1"/>
+          </p:cNvPicPr>
+          <p:nvPr/>
+        </p:nvPicPr>
+        <p:blipFill>
+          <a:blip r:embed="rId3"/>
+          <a:stretch>
+            <a:fillRect/>
+          </a:stretch>
+        </p:blipFill>
+        <p:spPr>
+          <a:xfrm>
+            <a:off x="5711983" y="2666213"/>
+            <a:ext cx="5480950" cy="3552286"/>
+          </a:xfrm>
+          <a:prstGeom prst="rect">
+            <a:avLst/>
+          </a:prstGeom>
+          <a:ln w="38100">
+            <a:solidFill>
+              <a:schemeClr val="tx1">
+                <a:lumMod val="85000"/>
+                <a:lumOff val="15000"/>
+              </a:schemeClr>
+            </a:solidFill>
+          </a:ln>
+        </p:spPr>
+      </p:pic>
     </p:spTree>
     <p:extLst>
       <p:ext uri="{BB962C8B-B14F-4D97-AF65-F5344CB8AC3E}">

</xml_diff>